<commit_message>
Fixes after slides review
</commit_message>
<xml_diff>
--- a/slides/AsynchronousIntuition.pptx
+++ b/slides/AsynchronousIntuition.pptx
@@ -13,13 +13,12 @@
     <p:sldId id="268" r:id="rId7"/>
     <p:sldId id="270" r:id="rId8"/>
     <p:sldId id="273" r:id="rId9"/>
-    <p:sldId id="263" r:id="rId10"/>
-    <p:sldId id="269" r:id="rId11"/>
-    <p:sldId id="274" r:id="rId12"/>
-    <p:sldId id="264" r:id="rId13"/>
-    <p:sldId id="267" r:id="rId14"/>
-    <p:sldId id="275" r:id="rId15"/>
-    <p:sldId id="276" r:id="rId16"/>
+    <p:sldId id="277" r:id="rId10"/>
+    <p:sldId id="274" r:id="rId11"/>
+    <p:sldId id="264" r:id="rId12"/>
+    <p:sldId id="267" r:id="rId13"/>
+    <p:sldId id="275" r:id="rId14"/>
+    <p:sldId id="276" r:id="rId15"/>
   </p:sldIdLst>
   <p:sldSz cx="12192000" cy="6858000"/>
   <p:notesSz cx="6858000" cy="9144000"/>
@@ -5938,7 +5937,7 @@
           <a:p>
             <a:r>
               <a:rPr lang="en-US" dirty="0"/>
-              <a:t>How to avoid problems and ask a valid question</a:t>
+              <a:t>How to avoid problems and ask valid questions</a:t>
             </a:r>
           </a:p>
         </p:txBody>
@@ -5993,212 +5992,6 @@
 </file>
 
 <file path=ppt/slides/slide10.xml><?xml version="1.0" encoding="utf-8"?>
-<p:sld xmlns:a="http://schemas.openxmlformats.org/drawingml/2006/main" xmlns:r="http://schemas.openxmlformats.org/officeDocument/2006/relationships" xmlns:p="http://schemas.openxmlformats.org/presentationml/2006/main" show="0">
-  <p:cSld>
-    <p:spTree>
-      <p:nvGrpSpPr>
-        <p:cNvPr id="1" name=""/>
-        <p:cNvGrpSpPr/>
-        <p:nvPr/>
-      </p:nvGrpSpPr>
-      <p:grpSpPr>
-        <a:xfrm>
-          <a:off x="0" y="0"/>
-          <a:ext cx="0" cy="0"/>
-          <a:chOff x="0" y="0"/>
-          <a:chExt cx="0" cy="0"/>
-        </a:xfrm>
-      </p:grpSpPr>
-      <p:grpSp>
-        <p:nvGrpSpPr>
-          <p:cNvPr id="5" name="Grupa 4">
-            <a:extLst>
-              <a:ext uri="{FF2B5EF4-FFF2-40B4-BE49-F238E27FC236}">
-                <a16:creationId xmlns:a16="http://schemas.microsoft.com/office/drawing/2014/main" id="{EF2CAC3E-8AD4-4E52-AF63-B64EF9258DB6}"/>
-              </a:ext>
-            </a:extLst>
-          </p:cNvPr>
-          <p:cNvGrpSpPr/>
-          <p:nvPr/>
-        </p:nvGrpSpPr>
-        <p:grpSpPr>
-          <a:xfrm>
-            <a:off x="4147127" y="1607127"/>
-            <a:ext cx="1182255" cy="2092418"/>
-            <a:chOff x="4147127" y="1607127"/>
-            <a:chExt cx="1182255" cy="2092418"/>
-          </a:xfrm>
-        </p:grpSpPr>
-        <p:sp>
-          <p:nvSpPr>
-            <p:cNvPr id="2" name="Prostokąt 1">
-              <a:extLst>
-                <a:ext uri="{FF2B5EF4-FFF2-40B4-BE49-F238E27FC236}">
-                  <a16:creationId xmlns:a16="http://schemas.microsoft.com/office/drawing/2014/main" id="{FC1BD6D8-FC47-4434-B411-5B77EA7E0B8B}"/>
-                </a:ext>
-              </a:extLst>
-            </p:cNvPr>
-            <p:cNvSpPr/>
-            <p:nvPr/>
-          </p:nvSpPr>
-          <p:spPr>
-            <a:xfrm>
-              <a:off x="4147127" y="1607127"/>
-              <a:ext cx="1182255" cy="2092418"/>
-            </a:xfrm>
-            <a:prstGeom prst="rect">
-              <a:avLst/>
-            </a:prstGeom>
-          </p:spPr>
-          <p:style>
-            <a:lnRef idx="2">
-              <a:schemeClr val="dk1">
-                <a:shade val="50000"/>
-              </a:schemeClr>
-            </a:lnRef>
-            <a:fillRef idx="1">
-              <a:schemeClr val="dk1"/>
-            </a:fillRef>
-            <a:effectRef idx="0">
-              <a:schemeClr val="dk1"/>
-            </a:effectRef>
-            <a:fontRef idx="minor">
-              <a:schemeClr val="lt1"/>
-            </a:fontRef>
-          </p:style>
-          <p:txBody>
-            <a:bodyPr rtlCol="0" anchor="ctr"/>
-            <a:lstStyle/>
-            <a:p>
-              <a:pPr algn="ctr"/>
-              <a:endParaRPr lang="pl-PL"/>
-            </a:p>
-          </p:txBody>
-        </p:sp>
-        <p:sp>
-          <p:nvSpPr>
-            <p:cNvPr id="3" name="Owal 2">
-              <a:extLst>
-                <a:ext uri="{FF2B5EF4-FFF2-40B4-BE49-F238E27FC236}">
-                  <a16:creationId xmlns:a16="http://schemas.microsoft.com/office/drawing/2014/main" id="{2C77E6FB-EB48-482E-B8FD-133058D4D4ED}"/>
-                </a:ext>
-              </a:extLst>
-            </p:cNvPr>
-            <p:cNvSpPr/>
-            <p:nvPr/>
-          </p:nvSpPr>
-          <p:spPr>
-            <a:xfrm>
-              <a:off x="4276860" y="2710693"/>
-              <a:ext cx="922788" cy="853579"/>
-            </a:xfrm>
-            <a:prstGeom prst="ellipse">
-              <a:avLst/>
-            </a:prstGeom>
-            <a:solidFill>
-              <a:schemeClr val="accent1">
-                <a:lumMod val="50000"/>
-              </a:schemeClr>
-            </a:solidFill>
-          </p:spPr>
-          <p:style>
-            <a:lnRef idx="2">
-              <a:schemeClr val="accent1">
-                <a:shade val="50000"/>
-              </a:schemeClr>
-            </a:lnRef>
-            <a:fillRef idx="1">
-              <a:schemeClr val="accent1"/>
-            </a:fillRef>
-            <a:effectRef idx="0">
-              <a:schemeClr val="accent1"/>
-            </a:effectRef>
-            <a:fontRef idx="minor">
-              <a:schemeClr val="lt1"/>
-            </a:fontRef>
-          </p:style>
-          <p:txBody>
-            <a:bodyPr rtlCol="0" anchor="ctr"/>
-            <a:lstStyle/>
-            <a:p>
-              <a:pPr algn="ctr"/>
-              <a:endParaRPr lang="pl-PL"/>
-            </a:p>
-          </p:txBody>
-        </p:sp>
-        <p:sp>
-          <p:nvSpPr>
-            <p:cNvPr id="4" name="Owal 3">
-              <a:extLst>
-                <a:ext uri="{FF2B5EF4-FFF2-40B4-BE49-F238E27FC236}">
-                  <a16:creationId xmlns:a16="http://schemas.microsoft.com/office/drawing/2014/main" id="{C544CE16-2406-4DCD-909C-A16FB04AB930}"/>
-                </a:ext>
-              </a:extLst>
-            </p:cNvPr>
-            <p:cNvSpPr/>
-            <p:nvPr/>
-          </p:nvSpPr>
-          <p:spPr>
-            <a:xfrm>
-              <a:off x="4276860" y="1721841"/>
-              <a:ext cx="922788" cy="853579"/>
-            </a:xfrm>
-            <a:prstGeom prst="ellipse">
-              <a:avLst/>
-            </a:prstGeom>
-            <a:solidFill>
-              <a:srgbClr val="FF0000"/>
-            </a:solidFill>
-          </p:spPr>
-          <p:style>
-            <a:lnRef idx="2">
-              <a:schemeClr val="accent1">
-                <a:shade val="50000"/>
-              </a:schemeClr>
-            </a:lnRef>
-            <a:fillRef idx="1">
-              <a:schemeClr val="accent1"/>
-            </a:fillRef>
-            <a:effectRef idx="0">
-              <a:schemeClr val="accent1"/>
-            </a:effectRef>
-            <a:fontRef idx="minor">
-              <a:schemeClr val="lt1"/>
-            </a:fontRef>
-          </p:style>
-          <p:txBody>
-            <a:bodyPr rtlCol="0" anchor="ctr"/>
-            <a:lstStyle/>
-            <a:p>
-              <a:pPr algn="ctr"/>
-              <a:endParaRPr lang="pl-PL">
-                <a:ln>
-                  <a:solidFill>
-                    <a:srgbClr val="FF0000"/>
-                  </a:solidFill>
-                </a:ln>
-                <a:solidFill>
-                  <a:srgbClr val="FF0000"/>
-                </a:solidFill>
-              </a:endParaRPr>
-            </a:p>
-          </p:txBody>
-        </p:sp>
-      </p:grpSp>
-    </p:spTree>
-    <p:extLst>
-      <p:ext uri="{BB962C8B-B14F-4D97-AF65-F5344CB8AC3E}">
-        <p14:creationId xmlns:p14="http://schemas.microsoft.com/office/powerpoint/2010/main" val="4234332544"/>
-      </p:ext>
-    </p:extLst>
-  </p:cSld>
-  <p:clrMapOvr>
-    <a:masterClrMapping/>
-  </p:clrMapOvr>
-</p:sld>
-</file>
-
-<file path=ppt/slides/slide11.xml><?xml version="1.0" encoding="utf-8"?>
 <p:sld xmlns:a="http://schemas.openxmlformats.org/drawingml/2006/main" xmlns:r="http://schemas.openxmlformats.org/officeDocument/2006/relationships" xmlns:p="http://schemas.openxmlformats.org/presentationml/2006/main">
   <p:cSld>
     <p:spTree>
@@ -6267,13 +6060,13 @@
           <a:p>
             <a:r>
               <a:rPr lang="en-US" dirty="0"/>
-              <a:t>Read carefully documentations.</a:t>
+              <a:t>Read documentation carefully.</a:t>
             </a:r>
           </a:p>
           <a:p>
             <a:r>
               <a:rPr lang="en-US" dirty="0"/>
-              <a:t>Samples are samples not a final solution.</a:t>
+              <a:t>Samples are just samples. They are not a final solution.</a:t>
             </a:r>
           </a:p>
           <a:p>
@@ -6312,7 +6105,7 @@
 </p:sld>
 </file>
 
-<file path=ppt/slides/slide12.xml><?xml version="1.0" encoding="utf-8"?>
+<file path=ppt/slides/slide11.xml><?xml version="1.0" encoding="utf-8"?>
 <p:sld xmlns:a="http://schemas.openxmlformats.org/drawingml/2006/main" xmlns:r="http://schemas.openxmlformats.org/officeDocument/2006/relationships" xmlns:p="http://schemas.openxmlformats.org/presentationml/2006/main">
   <p:cSld>
     <p:bg>
@@ -7080,7 +6873,7 @@
 </p:sld>
 </file>
 
-<file path=ppt/slides/slide13.xml><?xml version="1.0" encoding="utf-8"?>
+<file path=ppt/slides/slide12.xml><?xml version="1.0" encoding="utf-8"?>
 <p:sld xmlns:a="http://schemas.openxmlformats.org/drawingml/2006/main" xmlns:r="http://schemas.openxmlformats.org/officeDocument/2006/relationships" xmlns:p="http://schemas.openxmlformats.org/presentationml/2006/main">
   <p:cSld>
     <p:spTree>
@@ -7562,7 +7355,7 @@
 </p:sld>
 </file>
 
-<file path=ppt/slides/slide14.xml><?xml version="1.0" encoding="utf-8"?>
+<file path=ppt/slides/slide13.xml><?xml version="1.0" encoding="utf-8"?>
 <p:sld xmlns:a="http://schemas.openxmlformats.org/drawingml/2006/main" xmlns:r="http://schemas.openxmlformats.org/officeDocument/2006/relationships" xmlns:p="http://schemas.openxmlformats.org/presentationml/2006/main">
   <p:cSld>
     <p:spTree>
@@ -7646,7 +7439,7 @@
 </p:sld>
 </file>
 
-<file path=ppt/slides/slide15.xml><?xml version="1.0" encoding="utf-8"?>
+<file path=ppt/slides/slide14.xml><?xml version="1.0" encoding="utf-8"?>
 <p:sld xmlns:a="http://schemas.openxmlformats.org/drawingml/2006/main" xmlns:r="http://schemas.openxmlformats.org/officeDocument/2006/relationships" xmlns:p="http://schemas.openxmlformats.org/presentationml/2006/main">
   <p:cSld>
     <p:spTree>
@@ -8197,13 +7990,13 @@
           <a:p>
             <a:r>
               <a:rPr lang="en-US" dirty="0"/>
-              <a:t>Help us start thinking outside the box</a:t>
+              <a:t>Help us to start thinking outside the box.</a:t>
             </a:r>
           </a:p>
           <a:p>
             <a:r>
               <a:rPr lang="en-US" dirty="0"/>
-              <a:t>See where to look for traps.</a:t>
+              <a:t>See where to look for potential traps.</a:t>
             </a:r>
           </a:p>
           <a:p>
@@ -8623,7 +8416,7 @@
             <a:pPr lvl="1"/>
             <a:r>
               <a:rPr lang="en-US" sz="1600" dirty="0"/>
-              <a:t>I got chance to present on </a:t>
+              <a:t>I was presenting on </a:t>
             </a:r>
             <a:r>
               <a:rPr lang="en-US" sz="1600" dirty="0" err="1"/>
@@ -8808,31 +8601,31 @@
           <a:p>
             <a:r>
               <a:rPr lang="en-US" dirty="0"/>
-              <a:t>Warmup - async or no async that’s the question</a:t>
+              <a:t>Warm up - async or no async, that is the question.</a:t>
             </a:r>
           </a:p>
           <a:p>
             <a:r>
               <a:rPr lang="en-US" dirty="0"/>
-              <a:t>More work requires less time</a:t>
+              <a:t>More work with less time.</a:t>
             </a:r>
           </a:p>
           <a:p>
             <a:r>
               <a:rPr lang="en-US" dirty="0"/>
-              <a:t>Action block and never executed tasks</a:t>
+              <a:t>Action Block and never executed tasks.</a:t>
             </a:r>
           </a:p>
           <a:p>
             <a:r>
               <a:rPr lang="en-US" dirty="0"/>
-              <a:t>Concurrent dictionary and factory problem</a:t>
+              <a:t>Concurrent Dictionary and factory problem.</a:t>
             </a:r>
           </a:p>
           <a:p>
             <a:r>
               <a:rPr lang="en-US" dirty="0"/>
-              <a:t>Slim Semaphore deadlock</a:t>
+              <a:t>Slim Semaphore deadlock.</a:t>
             </a:r>
           </a:p>
         </p:txBody>
@@ -8919,31 +8712,31 @@
           <a:p>
             <a:r>
               <a:rPr lang="en-US" dirty="0"/>
-              <a:t>Warmup - async or no async that’s the question</a:t>
+              <a:t>Warm up - async or no async, that is the question.</a:t>
             </a:r>
           </a:p>
           <a:p>
             <a:r>
               <a:rPr lang="en-US" dirty="0"/>
-              <a:t>More work requires less time</a:t>
+              <a:t>More work with less time.</a:t>
             </a:r>
           </a:p>
           <a:p>
             <a:r>
               <a:rPr lang="en-US" dirty="0"/>
-              <a:t>Action block and never executed tasks</a:t>
+              <a:t>Action Block and never executed tasks.</a:t>
             </a:r>
           </a:p>
           <a:p>
             <a:r>
               <a:rPr lang="en-US" dirty="0"/>
-              <a:t>Concurrent dictionary and factory problem</a:t>
+              <a:t>Concurrent Dictionary and factory problem.</a:t>
             </a:r>
           </a:p>
           <a:p>
             <a:r>
               <a:rPr lang="en-US" dirty="0"/>
-              <a:t>Slim Semaphore deadlock</a:t>
+              <a:t>Slim Semaphore deadlock.</a:t>
             </a:r>
           </a:p>
         </p:txBody>
@@ -9074,7 +8867,7 @@
           <a:p>
             <a:r>
               <a:rPr lang="en-US" dirty="0"/>
-              <a:t>Core stuff</a:t>
+              <a:t>Core Staff</a:t>
             </a:r>
             <a:endParaRPr lang="pl-PL" dirty="0"/>
           </a:p>
@@ -10922,7 +10715,7 @@
 </file>
 
 <file path=ppt/slides/slide9.xml><?xml version="1.0" encoding="utf-8"?>
-<p:sld xmlns:a="http://schemas.openxmlformats.org/drawingml/2006/main" xmlns:r="http://schemas.openxmlformats.org/officeDocument/2006/relationships" xmlns:p="http://schemas.openxmlformats.org/presentationml/2006/main" show="0">
+<p:sld xmlns:a="http://schemas.openxmlformats.org/drawingml/2006/main" xmlns:r="http://schemas.openxmlformats.org/officeDocument/2006/relationships" xmlns:p="http://schemas.openxmlformats.org/presentationml/2006/main">
   <p:cSld>
     <p:spTree>
       <p:nvGrpSpPr>
@@ -10943,7 +10736,7 @@
           <p:cNvPr id="2" name="Tytuł 1">
             <a:extLst>
               <a:ext uri="{FF2B5EF4-FFF2-40B4-BE49-F238E27FC236}">
-                <a16:creationId xmlns:a16="http://schemas.microsoft.com/office/drawing/2014/main" id="{219DD17C-59DF-4EBF-A995-7EA4DE2A2058}"/>
+                <a16:creationId xmlns:a16="http://schemas.microsoft.com/office/drawing/2014/main" id="{76535B44-83C8-414A-89C5-03F2BB601FE7}"/>
               </a:ext>
             </a:extLst>
           </p:cNvPr>
@@ -10961,233 +10754,16 @@
           <a:p>
             <a:r>
               <a:rPr lang="en-US" dirty="0"/>
-              <a:t>Manual Reset Event </a:t>
+              <a:t>Demo</a:t>
             </a:r>
             <a:endParaRPr lang="pl-PL" dirty="0"/>
           </a:p>
         </p:txBody>
       </p:sp>
-      <p:sp>
-        <p:nvSpPr>
-          <p:cNvPr id="3" name="Symbol zastępczy zawartości 2">
-            <a:extLst>
-              <a:ext uri="{FF2B5EF4-FFF2-40B4-BE49-F238E27FC236}">
-                <a16:creationId xmlns:a16="http://schemas.microsoft.com/office/drawing/2014/main" id="{D03FA739-504E-4CDD-AED4-6ACF0CFDB750}"/>
-              </a:ext>
-            </a:extLst>
-          </p:cNvPr>
-          <p:cNvSpPr>
-            <a:spLocks noGrp="1"/>
-          </p:cNvSpPr>
-          <p:nvPr>
-            <p:ph idx="1"/>
-          </p:nvPr>
-        </p:nvSpPr>
-        <p:spPr/>
-        <p:txBody>
-          <a:bodyPr/>
-          <a:lstStyle/>
-          <a:p>
-            <a:r>
-              <a:rPr lang="en-US" dirty="0"/>
-              <a:t>Blocks all thread waiting. When it is signaled all threads can enter protected section.</a:t>
-            </a:r>
-          </a:p>
-          <a:p>
-            <a:r>
-              <a:rPr lang="en-US" dirty="0"/>
-              <a:t>Start line</a:t>
-            </a:r>
-          </a:p>
-          <a:p>
-            <a:r>
-              <a:rPr lang="en-US" dirty="0"/>
-              <a:t>Synchronizations point for multiple thread.</a:t>
-            </a:r>
-            <a:endParaRPr lang="pl-PL" dirty="0"/>
-          </a:p>
-        </p:txBody>
-      </p:sp>
-      <p:grpSp>
-        <p:nvGrpSpPr>
-          <p:cNvPr id="14" name="Grupa 13">
-            <a:extLst>
-              <a:ext uri="{FF2B5EF4-FFF2-40B4-BE49-F238E27FC236}">
-                <a16:creationId xmlns:a16="http://schemas.microsoft.com/office/drawing/2014/main" id="{105DF45A-8935-4829-BC04-F215A9B245B2}"/>
-              </a:ext>
-            </a:extLst>
-          </p:cNvPr>
-          <p:cNvGrpSpPr/>
-          <p:nvPr/>
-        </p:nvGrpSpPr>
-        <p:grpSpPr>
-          <a:xfrm>
-            <a:off x="9734197" y="3160553"/>
-            <a:ext cx="827544" cy="1478560"/>
-            <a:chOff x="4147127" y="1607127"/>
-            <a:chExt cx="1182255" cy="2092418"/>
-          </a:xfrm>
-        </p:grpSpPr>
-        <p:sp>
-          <p:nvSpPr>
-            <p:cNvPr id="15" name="Prostokąt 14">
-              <a:extLst>
-                <a:ext uri="{FF2B5EF4-FFF2-40B4-BE49-F238E27FC236}">
-                  <a16:creationId xmlns:a16="http://schemas.microsoft.com/office/drawing/2014/main" id="{A4839F76-B527-44EE-83BB-62F14CA8898C}"/>
-                </a:ext>
-              </a:extLst>
-            </p:cNvPr>
-            <p:cNvSpPr/>
-            <p:nvPr/>
-          </p:nvSpPr>
-          <p:spPr>
-            <a:xfrm>
-              <a:off x="4147127" y="1607127"/>
-              <a:ext cx="1182255" cy="2092418"/>
-            </a:xfrm>
-            <a:prstGeom prst="rect">
-              <a:avLst/>
-            </a:prstGeom>
-          </p:spPr>
-          <p:style>
-            <a:lnRef idx="2">
-              <a:schemeClr val="dk1">
-                <a:shade val="50000"/>
-              </a:schemeClr>
-            </a:lnRef>
-            <a:fillRef idx="1">
-              <a:schemeClr val="dk1"/>
-            </a:fillRef>
-            <a:effectRef idx="0">
-              <a:schemeClr val="dk1"/>
-            </a:effectRef>
-            <a:fontRef idx="minor">
-              <a:schemeClr val="lt1"/>
-            </a:fontRef>
-          </p:style>
-          <p:txBody>
-            <a:bodyPr rtlCol="0" anchor="ctr"/>
-            <a:lstStyle/>
-            <a:p>
-              <a:pPr algn="ctr"/>
-              <a:endParaRPr lang="pl-PL"/>
-            </a:p>
-          </p:txBody>
-        </p:sp>
-        <p:sp>
-          <p:nvSpPr>
-            <p:cNvPr id="16" name="Owal 15">
-              <a:extLst>
-                <a:ext uri="{FF2B5EF4-FFF2-40B4-BE49-F238E27FC236}">
-                  <a16:creationId xmlns:a16="http://schemas.microsoft.com/office/drawing/2014/main" id="{AA293148-E8BF-4274-818F-0DA4EF70398D}"/>
-                </a:ext>
-              </a:extLst>
-            </p:cNvPr>
-            <p:cNvSpPr/>
-            <p:nvPr/>
-          </p:nvSpPr>
-          <p:spPr>
-            <a:xfrm>
-              <a:off x="4276860" y="2710693"/>
-              <a:ext cx="922788" cy="853579"/>
-            </a:xfrm>
-            <a:prstGeom prst="ellipse">
-              <a:avLst/>
-            </a:prstGeom>
-            <a:solidFill>
-              <a:schemeClr val="accent1">
-                <a:lumMod val="50000"/>
-              </a:schemeClr>
-            </a:solidFill>
-          </p:spPr>
-          <p:style>
-            <a:lnRef idx="2">
-              <a:schemeClr val="accent1">
-                <a:shade val="50000"/>
-              </a:schemeClr>
-            </a:lnRef>
-            <a:fillRef idx="1">
-              <a:schemeClr val="accent1"/>
-            </a:fillRef>
-            <a:effectRef idx="0">
-              <a:schemeClr val="accent1"/>
-            </a:effectRef>
-            <a:fontRef idx="minor">
-              <a:schemeClr val="lt1"/>
-            </a:fontRef>
-          </p:style>
-          <p:txBody>
-            <a:bodyPr rtlCol="0" anchor="ctr"/>
-            <a:lstStyle/>
-            <a:p>
-              <a:pPr algn="ctr"/>
-              <a:endParaRPr lang="pl-PL"/>
-            </a:p>
-          </p:txBody>
-        </p:sp>
-        <p:sp>
-          <p:nvSpPr>
-            <p:cNvPr id="17" name="Owal 16">
-              <a:extLst>
-                <a:ext uri="{FF2B5EF4-FFF2-40B4-BE49-F238E27FC236}">
-                  <a16:creationId xmlns:a16="http://schemas.microsoft.com/office/drawing/2014/main" id="{06B07D13-99E0-442D-8C8D-78E02D153D59}"/>
-                </a:ext>
-              </a:extLst>
-            </p:cNvPr>
-            <p:cNvSpPr/>
-            <p:nvPr/>
-          </p:nvSpPr>
-          <p:spPr>
-            <a:xfrm>
-              <a:off x="4276860" y="1721841"/>
-              <a:ext cx="922788" cy="853579"/>
-            </a:xfrm>
-            <a:prstGeom prst="ellipse">
-              <a:avLst/>
-            </a:prstGeom>
-            <a:solidFill>
-              <a:srgbClr val="FF0000"/>
-            </a:solidFill>
-          </p:spPr>
-          <p:style>
-            <a:lnRef idx="2">
-              <a:schemeClr val="accent1">
-                <a:shade val="50000"/>
-              </a:schemeClr>
-            </a:lnRef>
-            <a:fillRef idx="1">
-              <a:schemeClr val="accent1"/>
-            </a:fillRef>
-            <a:effectRef idx="0">
-              <a:schemeClr val="accent1"/>
-            </a:effectRef>
-            <a:fontRef idx="minor">
-              <a:schemeClr val="lt1"/>
-            </a:fontRef>
-          </p:style>
-          <p:txBody>
-            <a:bodyPr rtlCol="0" anchor="ctr"/>
-            <a:lstStyle/>
-            <a:p>
-              <a:pPr algn="ctr"/>
-              <a:endParaRPr lang="pl-PL">
-                <a:ln>
-                  <a:solidFill>
-                    <a:srgbClr val="FF0000"/>
-                  </a:solidFill>
-                </a:ln>
-                <a:solidFill>
-                  <a:srgbClr val="FF0000"/>
-                </a:solidFill>
-              </a:endParaRPr>
-            </a:p>
-          </p:txBody>
-        </p:sp>
-      </p:grpSp>
     </p:spTree>
     <p:extLst>
       <p:ext uri="{BB962C8B-B14F-4D97-AF65-F5344CB8AC3E}">
-        <p14:creationId xmlns:p14="http://schemas.microsoft.com/office/powerpoint/2010/main" val="2572891360"/>
+        <p14:creationId xmlns:p14="http://schemas.microsoft.com/office/powerpoint/2010/main" val="761374811"/>
       </p:ext>
     </p:extLst>
   </p:cSld>

</xml_diff>